<commit_message>
update slide operacoes terminais - forEach
</commit_message>
<xml_diff>
--- a/Java Streams.pptx
+++ b/Java Streams.pptx
@@ -467,7 +467,7 @@
           <a:p>
             <a:fld id="{FBEFCFC3-0D84-4C0E-A64D-0008573548DA}" type="datetimeFigureOut">
               <a:rPr lang="en-IE" smtClean="0"/>
-              <a:t>23/12/2021</a:t>
+              <a:t>30/12/2021</a:t>
             </a:fld>
             <a:endParaRPr lang="en-IE" dirty="0"/>
           </a:p>
@@ -1554,7 +1554,7 @@
           <a:p>
             <a:fld id="{FBEFCFC3-0D84-4C0E-A64D-0008573548DA}" type="datetimeFigureOut">
               <a:rPr lang="en-IE" smtClean="0"/>
-              <a:t>23/12/2021</a:t>
+              <a:t>30/12/2021</a:t>
             </a:fld>
             <a:endParaRPr lang="en-IE" dirty="0"/>
           </a:p>
@@ -2534,7 +2534,7 @@
           <a:p>
             <a:fld id="{FBEFCFC3-0D84-4C0E-A64D-0008573548DA}" type="datetimeFigureOut">
               <a:rPr lang="en-IE" smtClean="0"/>
-              <a:t>23/12/2021</a:t>
+              <a:t>30/12/2021</a:t>
             </a:fld>
             <a:endParaRPr lang="en-IE" dirty="0"/>
           </a:p>
@@ -3668,7 +3668,7 @@
           <a:p>
             <a:fld id="{FBEFCFC3-0D84-4C0E-A64D-0008573548DA}" type="datetimeFigureOut">
               <a:rPr lang="en-IE" smtClean="0"/>
-              <a:t>23/12/2021</a:t>
+              <a:t>30/12/2021</a:t>
             </a:fld>
             <a:endParaRPr lang="en-IE" dirty="0"/>
           </a:p>
@@ -4701,7 +4701,7 @@
           <a:p>
             <a:fld id="{FBEFCFC3-0D84-4C0E-A64D-0008573548DA}" type="datetimeFigureOut">
               <a:rPr lang="en-IE" smtClean="0"/>
-              <a:t>23/12/2021</a:t>
+              <a:t>30/12/2021</a:t>
             </a:fld>
             <a:endParaRPr lang="en-IE" dirty="0"/>
           </a:p>
@@ -5361,7 +5361,7 @@
           <a:p>
             <a:fld id="{FBEFCFC3-0D84-4C0E-A64D-0008573548DA}" type="datetimeFigureOut">
               <a:rPr lang="en-IE" smtClean="0"/>
-              <a:t>23/12/2021</a:t>
+              <a:t>30/12/2021</a:t>
             </a:fld>
             <a:endParaRPr lang="en-IE" dirty="0"/>
           </a:p>
@@ -6219,7 +6219,7 @@
           <a:p>
             <a:fld id="{FBEFCFC3-0D84-4C0E-A64D-0008573548DA}" type="datetimeFigureOut">
               <a:rPr lang="en-IE" smtClean="0"/>
-              <a:t>23/12/2021</a:t>
+              <a:t>30/12/2021</a:t>
             </a:fld>
             <a:endParaRPr lang="en-IE" dirty="0"/>
           </a:p>
@@ -6409,7 +6409,7 @@
           <a:p>
             <a:fld id="{FBEFCFC3-0D84-4C0E-A64D-0008573548DA}" type="datetimeFigureOut">
               <a:rPr lang="en-IE" smtClean="0"/>
-              <a:t>23/12/2021</a:t>
+              <a:t>30/12/2021</a:t>
             </a:fld>
             <a:endParaRPr lang="en-IE" dirty="0"/>
           </a:p>
@@ -7381,7 +7381,7 @@
           <a:p>
             <a:fld id="{FBEFCFC3-0D84-4C0E-A64D-0008573548DA}" type="datetimeFigureOut">
               <a:rPr lang="en-IE" smtClean="0"/>
-              <a:t>23/12/2021</a:t>
+              <a:t>30/12/2021</a:t>
             </a:fld>
             <a:endParaRPr lang="en-IE" dirty="0"/>
           </a:p>
@@ -7592,7 +7592,7 @@
           <a:p>
             <a:fld id="{FBEFCFC3-0D84-4C0E-A64D-0008573548DA}" type="datetimeFigureOut">
               <a:rPr lang="en-IE" smtClean="0"/>
-              <a:t>23/12/2021</a:t>
+              <a:t>30/12/2021</a:t>
             </a:fld>
             <a:endParaRPr lang="en-IE" dirty="0"/>
           </a:p>
@@ -8626,7 +8626,7 @@
           <a:p>
             <a:fld id="{FBEFCFC3-0D84-4C0E-A64D-0008573548DA}" type="datetimeFigureOut">
               <a:rPr lang="en-IE" smtClean="0"/>
-              <a:t>23/12/2021</a:t>
+              <a:t>30/12/2021</a:t>
             </a:fld>
             <a:endParaRPr lang="en-IE" dirty="0"/>
           </a:p>
@@ -8898,7 +8898,7 @@
           <a:p>
             <a:fld id="{FBEFCFC3-0D84-4C0E-A64D-0008573548DA}" type="datetimeFigureOut">
               <a:rPr lang="en-IE" smtClean="0"/>
-              <a:t>23/12/2021</a:t>
+              <a:t>30/12/2021</a:t>
             </a:fld>
             <a:endParaRPr lang="en-IE" dirty="0"/>
           </a:p>
@@ -9308,7 +9308,7 @@
           <a:p>
             <a:fld id="{FBEFCFC3-0D84-4C0E-A64D-0008573548DA}" type="datetimeFigureOut">
               <a:rPr lang="en-IE" smtClean="0"/>
-              <a:t>23/12/2021</a:t>
+              <a:t>30/12/2021</a:t>
             </a:fld>
             <a:endParaRPr lang="en-IE" dirty="0"/>
           </a:p>
@@ -9435,7 +9435,7 @@
           <a:p>
             <a:fld id="{FBEFCFC3-0D84-4C0E-A64D-0008573548DA}" type="datetimeFigureOut">
               <a:rPr lang="en-IE" smtClean="0"/>
-              <a:t>23/12/2021</a:t>
+              <a:t>30/12/2021</a:t>
             </a:fld>
             <a:endParaRPr lang="en-IE" dirty="0"/>
           </a:p>
@@ -9530,7 +9530,7 @@
           <a:p>
             <a:fld id="{FBEFCFC3-0D84-4C0E-A64D-0008573548DA}" type="datetimeFigureOut">
               <a:rPr lang="en-IE" smtClean="0"/>
-              <a:t>23/12/2021</a:t>
+              <a:t>30/12/2021</a:t>
             </a:fld>
             <a:endParaRPr lang="en-IE" dirty="0"/>
           </a:p>
@@ -10611,7 +10611,7 @@
           <a:p>
             <a:fld id="{FBEFCFC3-0D84-4C0E-A64D-0008573548DA}" type="datetimeFigureOut">
               <a:rPr lang="en-IE" smtClean="0"/>
-              <a:t>23/12/2021</a:t>
+              <a:t>30/12/2021</a:t>
             </a:fld>
             <a:endParaRPr lang="en-IE" dirty="0"/>
           </a:p>
@@ -11718,7 +11718,7 @@
           <a:p>
             <a:fld id="{FBEFCFC3-0D84-4C0E-A64D-0008573548DA}" type="datetimeFigureOut">
               <a:rPr lang="en-IE" smtClean="0"/>
-              <a:t>23/12/2021</a:t>
+              <a:t>30/12/2021</a:t>
             </a:fld>
             <a:endParaRPr lang="en-IE" dirty="0"/>
           </a:p>
@@ -12715,7 +12715,7 @@
           <a:p>
             <a:fld id="{FBEFCFC3-0D84-4C0E-A64D-0008573548DA}" type="datetimeFigureOut">
               <a:rPr lang="en-IE" smtClean="0"/>
-              <a:t>23/12/2021</a:t>
+              <a:t>30/12/2021</a:t>
             </a:fld>
             <a:endParaRPr lang="en-IE" dirty="0"/>
           </a:p>
@@ -17720,15 +17720,7 @@
             </a:r>
             <a:r>
               <a:rPr lang="pt-BR" dirty="0"/>
-              <a:t>(ex. Filter</a:t>
-            </a:r>
-            <a:r>
-              <a:rPr lang="en-GB" dirty="0"/>
-              <a:t>()</a:t>
-            </a:r>
-            <a:r>
-              <a:rPr lang="pt-BR" dirty="0"/>
-              <a:t>) que retornam um resultado</a:t>
+              <a:t>(ex. forEach()) que retornam um resultado</a:t>
             </a:r>
           </a:p>
           <a:p>

</xml_diff>